<commit_message>
hld e lld atualizados
</commit_message>
<xml_diff>
--- a/documentação/img projeto/HLE_LLD.pptx
+++ b/documentação/img projeto/HLE_LLD.pptx
@@ -3358,10 +3358,10 @@
       </p:grpSpPr>
       <p:pic>
         <p:nvPicPr>
-          <p:cNvPr id="3" name="Picture 2">
+          <p:cNvPr id="4" name="Imagem 3" descr="Mapa colorido com texto preto sobre fundo branco&#10;&#10;Descrição gerada automaticamente">
             <a:extLst>
               <a:ext uri="{FF2B5EF4-FFF2-40B4-BE49-F238E27FC236}">
-                <a16:creationId xmlns:a16="http://schemas.microsoft.com/office/drawing/2014/main" id="{1CF03E58-0B96-4176-890C-5C38BB20B555}"/>
+                <a16:creationId xmlns:a16="http://schemas.microsoft.com/office/drawing/2014/main" id="{2B45B350-A80F-47EF-8559-1411A6DF0E58}"/>
               </a:ext>
             </a:extLst>
           </p:cNvPr>
@@ -3384,8 +3384,8 @@
         </p:blipFill>
         <p:spPr>
           <a:xfrm>
-            <a:off x="12105" y="0"/>
-            <a:ext cx="12167790" cy="6858000"/>
+            <a:off x="-9770" y="0"/>
+            <a:ext cx="12211539" cy="6858000"/>
           </a:xfrm>
           <a:prstGeom prst="rect">
             <a:avLst/>

</xml_diff>

<commit_message>
atualização da imagem de projeto
</commit_message>
<xml_diff>
--- a/documentação/img projeto/HLE_LLD.pptx
+++ b/documentação/img projeto/HLE_LLD.pptx
@@ -8,6 +8,8 @@
     <p:sldId id="258" r:id="rId2"/>
     <p:sldId id="256" r:id="rId3"/>
     <p:sldId id="261" r:id="rId4"/>
+    <p:sldId id="262" r:id="rId5"/>
+    <p:sldId id="263" r:id="rId6"/>
   </p:sldIdLst>
   <p:sldSz cx="12192000" cy="6858000"/>
   <p:notesSz cx="6858000" cy="9144000"/>
@@ -246,7 +248,7 @@
           <a:p>
             <a:fld id="{AC89BC54-1CDC-4473-9720-F58E1E464D2A}" type="datetimeFigureOut">
               <a:rPr lang="pt-BR" smtClean="0"/>
-              <a:t>23/04/2020</a:t>
+              <a:t>26/04/2020</a:t>
             </a:fld>
             <a:endParaRPr lang="pt-BR"/>
           </a:p>
@@ -583,7 +585,7 @@
           <a:p>
             <a:fld id="{AC89BC54-1CDC-4473-9720-F58E1E464D2A}" type="datetimeFigureOut">
               <a:rPr lang="pt-BR" smtClean="0"/>
-              <a:t>23/04/2020</a:t>
+              <a:t>26/04/2020</a:t>
             </a:fld>
             <a:endParaRPr lang="pt-BR"/>
           </a:p>
@@ -747,7 +749,7 @@
           <a:p>
             <a:fld id="{AC89BC54-1CDC-4473-9720-F58E1E464D2A}" type="datetimeFigureOut">
               <a:rPr lang="pt-BR" smtClean="0"/>
-              <a:t>23/04/2020</a:t>
+              <a:t>26/04/2020</a:t>
             </a:fld>
             <a:endParaRPr lang="pt-BR"/>
           </a:p>
@@ -988,7 +990,7 @@
           <a:p>
             <a:fld id="{AC89BC54-1CDC-4473-9720-F58E1E464D2A}" type="datetimeFigureOut">
               <a:rPr lang="pt-BR" smtClean="0"/>
-              <a:t>23/04/2020</a:t>
+              <a:t>26/04/2020</a:t>
             </a:fld>
             <a:endParaRPr lang="pt-BR"/>
           </a:p>
@@ -1213,7 +1215,7 @@
           <a:p>
             <a:fld id="{AC89BC54-1CDC-4473-9720-F58E1E464D2A}" type="datetimeFigureOut">
               <a:rPr lang="pt-BR" smtClean="0"/>
-              <a:t>23/04/2020</a:t>
+              <a:t>26/04/2020</a:t>
             </a:fld>
             <a:endParaRPr lang="pt-BR"/>
           </a:p>
@@ -1573,7 +1575,7 @@
           <a:p>
             <a:fld id="{AC89BC54-1CDC-4473-9720-F58E1E464D2A}" type="datetimeFigureOut">
               <a:rPr lang="pt-BR" smtClean="0"/>
-              <a:t>23/04/2020</a:t>
+              <a:t>26/04/2020</a:t>
             </a:fld>
             <a:endParaRPr lang="pt-BR"/>
           </a:p>
@@ -1686,7 +1688,7 @@
           <a:p>
             <a:fld id="{AC89BC54-1CDC-4473-9720-F58E1E464D2A}" type="datetimeFigureOut">
               <a:rPr lang="pt-BR" smtClean="0"/>
-              <a:t>23/04/2020</a:t>
+              <a:t>26/04/2020</a:t>
             </a:fld>
             <a:endParaRPr lang="pt-BR"/>
           </a:p>
@@ -1777,7 +1779,7 @@
           <a:p>
             <a:fld id="{AC89BC54-1CDC-4473-9720-F58E1E464D2A}" type="datetimeFigureOut">
               <a:rPr lang="pt-BR" smtClean="0"/>
-              <a:t>23/04/2020</a:t>
+              <a:t>26/04/2020</a:t>
             </a:fld>
             <a:endParaRPr lang="pt-BR"/>
           </a:p>
@@ -2295,7 +2297,7 @@
           <a:p>
             <a:fld id="{AC89BC54-1CDC-4473-9720-F58E1E464D2A}" type="datetimeFigureOut">
               <a:rPr lang="pt-BR" smtClean="0"/>
-              <a:t>23/04/2020</a:t>
+              <a:t>26/04/2020</a:t>
             </a:fld>
             <a:endParaRPr lang="pt-BR"/>
           </a:p>
@@ -2504,7 +2506,7 @@
           <a:p>
             <a:fld id="{AC89BC54-1CDC-4473-9720-F58E1E464D2A}" type="datetimeFigureOut">
               <a:rPr lang="pt-BR" smtClean="0"/>
-              <a:t>23/04/2020</a:t>
+              <a:t>26/04/2020</a:t>
             </a:fld>
             <a:endParaRPr lang="pt-BR"/>
           </a:p>
@@ -4476,7 +4478,7 @@
               <a:lstStyle/>
               <a:p>
                 <a:pPr algn="ctr"/>
-                <a:endParaRPr lang="pt-BR" altLang="en-US"/>
+                <a:endParaRPr lang="pt-BR" altLang="en-US" dirty="0"/>
               </a:p>
             </p:txBody>
           </p:sp>
@@ -5168,6 +5170,1882 @@
         </p:sp>
       </p:grpSp>
     </p:spTree>
+  </p:cSld>
+  <p:clrMapOvr>
+    <a:masterClrMapping/>
+  </p:clrMapOvr>
+</p:sld>
+</file>
+
+<file path=ppt/slides/slide4.xml><?xml version="1.0" encoding="utf-8"?>
+<p:sld xmlns:a="http://schemas.openxmlformats.org/drawingml/2006/main" xmlns:r="http://schemas.openxmlformats.org/officeDocument/2006/relationships" xmlns:p="http://schemas.openxmlformats.org/presentationml/2006/main">
+  <p:cSld>
+    <p:spTree>
+      <p:nvGrpSpPr>
+        <p:cNvPr id="1" name=""/>
+        <p:cNvGrpSpPr/>
+        <p:nvPr/>
+      </p:nvGrpSpPr>
+      <p:grpSpPr>
+        <a:xfrm>
+          <a:off x="0" y="0"/>
+          <a:ext cx="0" cy="0"/>
+          <a:chOff x="0" y="0"/>
+          <a:chExt cx="0" cy="0"/>
+        </a:xfrm>
+      </p:grpSpPr>
+      <p:sp>
+        <p:nvSpPr>
+          <p:cNvPr id="50" name="Retângulo arredondado 50">
+            <a:extLst>
+              <a:ext uri="{FF2B5EF4-FFF2-40B4-BE49-F238E27FC236}">
+                <a16:creationId xmlns:a16="http://schemas.microsoft.com/office/drawing/2014/main" id="{DED68DD1-2280-42C4-9642-D2D896CF5548}"/>
+              </a:ext>
+            </a:extLst>
+          </p:cNvPr>
+          <p:cNvSpPr/>
+          <p:nvPr/>
+        </p:nvSpPr>
+        <p:spPr>
+          <a:xfrm>
+            <a:off x="2041072" y="1649550"/>
+            <a:ext cx="8055428" cy="3763736"/>
+          </a:xfrm>
+          <a:prstGeom prst="roundRect">
+            <a:avLst/>
+          </a:prstGeom>
+          <a:noFill/>
+          <a:ln w="28575" cmpd="sng">
+            <a:solidFill>
+              <a:schemeClr val="tx1"/>
+            </a:solidFill>
+            <a:prstDash val="solid"/>
+          </a:ln>
+        </p:spPr>
+        <p:style>
+          <a:lnRef idx="2">
+            <a:schemeClr val="accent1">
+              <a:shade val="50000"/>
+            </a:schemeClr>
+          </a:lnRef>
+          <a:fillRef idx="1">
+            <a:schemeClr val="accent1"/>
+          </a:fillRef>
+          <a:effectRef idx="0">
+            <a:schemeClr val="accent1"/>
+          </a:effectRef>
+          <a:fontRef idx="minor">
+            <a:schemeClr val="lt1"/>
+          </a:fontRef>
+        </p:style>
+        <p:txBody>
+          <a:bodyPr rtlCol="0" anchor="ctr"/>
+          <a:lstStyle/>
+          <a:p>
+            <a:pPr algn="ctr"/>
+            <a:endParaRPr lang="pt-BR" altLang="en-US" dirty="0"/>
+          </a:p>
+        </p:txBody>
+      </p:sp>
+      <p:pic>
+        <p:nvPicPr>
+          <p:cNvPr id="51" name="Imagem 50">
+            <a:extLst>
+              <a:ext uri="{FF2B5EF4-FFF2-40B4-BE49-F238E27FC236}">
+                <a16:creationId xmlns:a16="http://schemas.microsoft.com/office/drawing/2014/main" id="{3B5CEAC8-47F4-4188-BAC6-DF5450F3678C}"/>
+              </a:ext>
+            </a:extLst>
+          </p:cNvPr>
+          <p:cNvPicPr>
+            <a:picLocks noChangeAspect="1"/>
+          </p:cNvPicPr>
+          <p:nvPr/>
+        </p:nvPicPr>
+        <p:blipFill rotWithShape="1">
+          <a:blip r:embed="rId2" cstate="print">
+            <a:extLst>
+              <a:ext uri="{BEBA8EAE-BF5A-486C-A8C5-ECC9F3942E4B}">
+                <a14:imgProps xmlns:a14="http://schemas.microsoft.com/office/drawing/2010/main">
+                  <a14:imgLayer r:embed="rId3">
+                    <a14:imgEffect>
+                      <a14:backgroundRemoval t="21852" b="77870" l="30400" r="71000">
+                        <a14:foregroundMark x1="50300" y1="35926" x2="50300" y2="35926"/>
+                        <a14:foregroundMark x1="39700" y1="33056" x2="44500" y2="31204"/>
+                        <a14:foregroundMark x1="45700" y1="30833" x2="49900" y2="30278"/>
+                        <a14:foregroundMark x1="51700" y1="30463" x2="55200" y2="30648"/>
+                        <a14:foregroundMark x1="36200" y1="27222" x2="41000" y2="25278"/>
+                        <a14:foregroundMark x1="43500" y1="56296" x2="50300" y2="56852"/>
+                        <a14:foregroundMark x1="45300" y1="72593" x2="45300" y2="72593"/>
+                        <a14:foregroundMark x1="48000" y1="73241" x2="48000" y2="73241"/>
+                        <a14:foregroundMark x1="50800" y1="73426" x2="50800" y2="73426"/>
+                        <a14:foregroundMark x1="53000" y1="73981" x2="53000" y2="73981"/>
+                        <a14:foregroundMark x1="55800" y1="73704" x2="55800" y2="73704"/>
+                        <a14:foregroundMark x1="44600" y1="74259" x2="44600" y2="74259"/>
+                        <a14:backgroundMark x1="53700" y1="73981" x2="53700" y2="73981"/>
+                        <a14:backgroundMark x1="56500" y1="73056" x2="56500" y2="73056"/>
+                      </a14:backgroundRemoval>
+                    </a14:imgEffect>
+                  </a14:imgLayer>
+                </a14:imgProps>
+              </a:ext>
+              <a:ext uri="{28A0092B-C50C-407E-A947-70E740481C1C}">
+                <a14:useLocalDpi xmlns:a14="http://schemas.microsoft.com/office/drawing/2010/main" val="0"/>
+              </a:ext>
+            </a:extLst>
+          </a:blip>
+          <a:srcRect l="30757" t="69152" r="26553" b="23094"/>
+          <a:stretch/>
+        </p:blipFill>
+        <p:spPr>
+          <a:xfrm>
+            <a:off x="2430242" y="4166640"/>
+            <a:ext cx="1678252" cy="333434"/>
+          </a:xfrm>
+          <a:prstGeom prst="rect">
+            <a:avLst/>
+          </a:prstGeom>
+        </p:spPr>
+      </p:pic>
+      <p:pic>
+        <p:nvPicPr>
+          <p:cNvPr id="52" name="Imagem 51">
+            <a:extLst>
+              <a:ext uri="{FF2B5EF4-FFF2-40B4-BE49-F238E27FC236}">
+                <a16:creationId xmlns:a16="http://schemas.microsoft.com/office/drawing/2014/main" id="{98F0A73B-7F36-4F4E-9D05-84F71FCEDE0A}"/>
+              </a:ext>
+            </a:extLst>
+          </p:cNvPr>
+          <p:cNvPicPr>
+            <a:picLocks noChangeAspect="1"/>
+          </p:cNvPicPr>
+          <p:nvPr/>
+        </p:nvPicPr>
+        <p:blipFill rotWithShape="1">
+          <a:blip r:embed="rId4">
+            <a:extLst>
+              <a:ext uri="{28A0092B-C50C-407E-A947-70E740481C1C}">
+                <a14:useLocalDpi xmlns:a14="http://schemas.microsoft.com/office/drawing/2010/main" val="0"/>
+              </a:ext>
+            </a:extLst>
+          </a:blip>
+          <a:srcRect l="4378" t="7096" r="5364" b="5712"/>
+          <a:stretch/>
+        </p:blipFill>
+        <p:spPr>
+          <a:xfrm>
+            <a:off x="7611497" y="2843195"/>
+            <a:ext cx="2388850" cy="1570397"/>
+          </a:xfrm>
+          <a:prstGeom prst="rect">
+            <a:avLst/>
+          </a:prstGeom>
+        </p:spPr>
+      </p:pic>
+      <p:pic>
+        <p:nvPicPr>
+          <p:cNvPr id="53" name="Imagem 52">
+            <a:extLst>
+              <a:ext uri="{FF2B5EF4-FFF2-40B4-BE49-F238E27FC236}">
+                <a16:creationId xmlns:a16="http://schemas.microsoft.com/office/drawing/2014/main" id="{82096135-F75D-42F7-B6B0-5176E7ED2C54}"/>
+              </a:ext>
+            </a:extLst>
+          </p:cNvPr>
+          <p:cNvPicPr>
+            <a:picLocks noChangeAspect="1"/>
+          </p:cNvPicPr>
+          <p:nvPr/>
+        </p:nvPicPr>
+        <p:blipFill>
+          <a:blip r:embed="rId5" cstate="print">
+            <a:extLst>
+              <a:ext uri="{28A0092B-C50C-407E-A947-70E740481C1C}">
+                <a14:useLocalDpi xmlns:a14="http://schemas.microsoft.com/office/drawing/2010/main" val="0"/>
+              </a:ext>
+            </a:extLst>
+          </a:blip>
+          <a:stretch>
+            <a:fillRect/>
+          </a:stretch>
+        </p:blipFill>
+        <p:spPr>
+          <a:xfrm>
+            <a:off x="4601622" y="2751241"/>
+            <a:ext cx="2476840" cy="1915543"/>
+          </a:xfrm>
+          <a:prstGeom prst="rect">
+            <a:avLst/>
+          </a:prstGeom>
+        </p:spPr>
+      </p:pic>
+      <p:cxnSp>
+        <p:nvCxnSpPr>
+          <p:cNvPr id="55" name="Conector de Seta Reta 54">
+            <a:extLst>
+              <a:ext uri="{FF2B5EF4-FFF2-40B4-BE49-F238E27FC236}">
+                <a16:creationId xmlns:a16="http://schemas.microsoft.com/office/drawing/2014/main" id="{0E63BFC9-662A-478F-AD1D-F44DB6EFCF44}"/>
+              </a:ext>
+            </a:extLst>
+          </p:cNvPr>
+          <p:cNvCxnSpPr>
+            <a:cxnSpLocks/>
+          </p:cNvCxnSpPr>
+          <p:nvPr/>
+        </p:nvCxnSpPr>
+        <p:spPr>
+          <a:xfrm>
+            <a:off x="4012328" y="3709013"/>
+            <a:ext cx="769058" cy="0"/>
+          </a:xfrm>
+          <a:prstGeom prst="straightConnector1">
+            <a:avLst/>
+          </a:prstGeom>
+          <a:ln w="28575" cmpd="sng">
+            <a:solidFill>
+              <a:schemeClr val="tx1"/>
+            </a:solidFill>
+            <a:prstDash val="sysDash"/>
+            <a:tailEnd type="arrow"/>
+          </a:ln>
+        </p:spPr>
+        <p:style>
+          <a:lnRef idx="1">
+            <a:schemeClr val="accent1"/>
+          </a:lnRef>
+          <a:fillRef idx="0">
+            <a:schemeClr val="accent1"/>
+          </a:fillRef>
+          <a:effectRef idx="0">
+            <a:schemeClr val="accent1"/>
+          </a:effectRef>
+          <a:fontRef idx="minor">
+            <a:schemeClr val="tx1"/>
+          </a:fontRef>
+        </p:style>
+      </p:cxnSp>
+      <p:sp>
+        <p:nvSpPr>
+          <p:cNvPr id="56" name="CaixaDeTexto 55">
+            <a:extLst>
+              <a:ext uri="{FF2B5EF4-FFF2-40B4-BE49-F238E27FC236}">
+                <a16:creationId xmlns:a16="http://schemas.microsoft.com/office/drawing/2014/main" id="{E0128916-AEB9-4BB0-A248-D9B45905237A}"/>
+              </a:ext>
+            </a:extLst>
+          </p:cNvPr>
+          <p:cNvSpPr txBox="1"/>
+          <p:nvPr/>
+        </p:nvSpPr>
+        <p:spPr>
+          <a:xfrm>
+            <a:off x="8870721" y="1679459"/>
+            <a:ext cx="855419" cy="369332"/>
+          </a:xfrm>
+          <a:prstGeom prst="rect">
+            <a:avLst/>
+          </a:prstGeom>
+          <a:noFill/>
+        </p:spPr>
+        <p:txBody>
+          <a:bodyPr wrap="square" rtlCol="0">
+            <a:spAutoFit/>
+          </a:bodyPr>
+          <a:lstStyle/>
+          <a:p>
+            <a:r>
+              <a:rPr lang="pt-BR" b="1" dirty="0">
+                <a:latin typeface="+mj-lt"/>
+              </a:rPr>
+              <a:t>Local</a:t>
+            </a:r>
+            <a:endParaRPr lang="pt-BR" sz="1400" b="1" dirty="0">
+              <a:latin typeface="+mj-lt"/>
+            </a:endParaRPr>
+          </a:p>
+        </p:txBody>
+      </p:sp>
+      <p:sp>
+        <p:nvSpPr>
+          <p:cNvPr id="57" name="CaixaDeTexto 56">
+            <a:extLst>
+              <a:ext uri="{FF2B5EF4-FFF2-40B4-BE49-F238E27FC236}">
+                <a16:creationId xmlns:a16="http://schemas.microsoft.com/office/drawing/2014/main" id="{0B368CC2-C078-4C2C-B5EA-FAE3A17D465F}"/>
+              </a:ext>
+            </a:extLst>
+          </p:cNvPr>
+          <p:cNvSpPr txBox="1"/>
+          <p:nvPr/>
+        </p:nvSpPr>
+        <p:spPr>
+          <a:xfrm>
+            <a:off x="5082474" y="1649550"/>
+            <a:ext cx="1828387" cy="369332"/>
+          </a:xfrm>
+          <a:prstGeom prst="rect">
+            <a:avLst/>
+          </a:prstGeom>
+          <a:noFill/>
+        </p:spPr>
+        <p:txBody>
+          <a:bodyPr wrap="square" rtlCol="0">
+            <a:spAutoFit/>
+          </a:bodyPr>
+          <a:lstStyle/>
+          <a:p>
+            <a:r>
+              <a:rPr lang="pt-BR" b="1" dirty="0">
+                <a:latin typeface="+mj-lt"/>
+              </a:rPr>
+              <a:t>Sensor Virtual</a:t>
+            </a:r>
+          </a:p>
+        </p:txBody>
+      </p:sp>
+      <p:pic>
+        <p:nvPicPr>
+          <p:cNvPr id="58" name="Imagem 57">
+            <a:extLst>
+              <a:ext uri="{FF2B5EF4-FFF2-40B4-BE49-F238E27FC236}">
+                <a16:creationId xmlns:a16="http://schemas.microsoft.com/office/drawing/2014/main" id="{DCAC7098-638B-4DD6-8B7C-70D49B2DEC36}"/>
+              </a:ext>
+            </a:extLst>
+          </p:cNvPr>
+          <p:cNvPicPr>
+            <a:picLocks noChangeAspect="1"/>
+          </p:cNvPicPr>
+          <p:nvPr/>
+        </p:nvPicPr>
+        <p:blipFill rotWithShape="1">
+          <a:blip r:embed="rId6" cstate="print">
+            <a:extLst>
+              <a:ext uri="{BEBA8EAE-BF5A-486C-A8C5-ECC9F3942E4B}">
+                <a14:imgProps xmlns:a14="http://schemas.microsoft.com/office/drawing/2010/main">
+                  <a14:imgLayer r:embed="rId7">
+                    <a14:imgEffect>
+                      <a14:backgroundRemoval t="21852" b="77870" l="30400" r="71000">
+                        <a14:foregroundMark x1="50300" y1="35926" x2="50300" y2="35926"/>
+                        <a14:foregroundMark x1="39700" y1="33056" x2="44500" y2="31204"/>
+                        <a14:foregroundMark x1="45700" y1="30833" x2="49900" y2="30278"/>
+                        <a14:foregroundMark x1="51700" y1="30463" x2="55200" y2="30648"/>
+                        <a14:foregroundMark x1="36200" y1="27222" x2="41000" y2="25278"/>
+                        <a14:foregroundMark x1="43500" y1="56296" x2="50300" y2="56852"/>
+                        <a14:foregroundMark x1="45300" y1="72593" x2="45300" y2="72593"/>
+                        <a14:foregroundMark x1="48000" y1="73241" x2="48000" y2="73241"/>
+                        <a14:foregroundMark x1="50800" y1="73426" x2="50800" y2="73426"/>
+                        <a14:foregroundMark x1="53000" y1="73981" x2="53000" y2="73981"/>
+                        <a14:foregroundMark x1="55800" y1="73704" x2="55800" y2="73704"/>
+                        <a14:foregroundMark x1="44600" y1="74259" x2="44600" y2="74259"/>
+                        <a14:backgroundMark x1="53700" y1="73981" x2="53700" y2="73981"/>
+                        <a14:backgroundMark x1="56500" y1="73056" x2="56500" y2="73056"/>
+                      </a14:backgroundRemoval>
+                    </a14:imgEffect>
+                  </a14:imgLayer>
+                </a14:imgProps>
+              </a:ext>
+              <a:ext uri="{28A0092B-C50C-407E-A947-70E740481C1C}">
+                <a14:useLocalDpi xmlns:a14="http://schemas.microsoft.com/office/drawing/2010/main" val="0"/>
+              </a:ext>
+            </a:extLst>
+          </a:blip>
+          <a:srcRect l="30757" t="21786" r="29000" b="33665"/>
+          <a:stretch/>
+        </p:blipFill>
+        <p:spPr>
+          <a:xfrm>
+            <a:off x="2430242" y="2471228"/>
+            <a:ext cx="1582086" cy="1915543"/>
+          </a:xfrm>
+          <a:prstGeom prst="rect">
+            <a:avLst/>
+          </a:prstGeom>
+        </p:spPr>
+      </p:pic>
+      <p:sp>
+        <p:nvSpPr>
+          <p:cNvPr id="59" name="CaixaDeTexto 58">
+            <a:extLst>
+              <a:ext uri="{FF2B5EF4-FFF2-40B4-BE49-F238E27FC236}">
+                <a16:creationId xmlns:a16="http://schemas.microsoft.com/office/drawing/2014/main" id="{A839019D-C6CD-4535-B5FE-A9A1AEBF8E0F}"/>
+              </a:ext>
+            </a:extLst>
+          </p:cNvPr>
+          <p:cNvSpPr txBox="1"/>
+          <p:nvPr/>
+        </p:nvSpPr>
+        <p:spPr>
+          <a:xfrm>
+            <a:off x="8805922" y="4500074"/>
+            <a:ext cx="823663" cy="338554"/>
+          </a:xfrm>
+          <a:prstGeom prst="rect">
+            <a:avLst/>
+          </a:prstGeom>
+          <a:noFill/>
+        </p:spPr>
+        <p:txBody>
+          <a:bodyPr wrap="square" rtlCol="0">
+            <a:spAutoFit/>
+          </a:bodyPr>
+          <a:lstStyle/>
+          <a:p>
+            <a:r>
+              <a:rPr lang="pt-BR" sz="1600" dirty="0"/>
+              <a:t>API</a:t>
+            </a:r>
+            <a:endParaRPr lang="pt-BR" sz="1100" dirty="0"/>
+          </a:p>
+        </p:txBody>
+      </p:sp>
+      <p:pic>
+        <p:nvPicPr>
+          <p:cNvPr id="69" name="Imagem 68">
+            <a:extLst>
+              <a:ext uri="{FF2B5EF4-FFF2-40B4-BE49-F238E27FC236}">
+                <a16:creationId xmlns:a16="http://schemas.microsoft.com/office/drawing/2014/main" id="{9A38B837-808E-4415-BB6F-7B25381C58B8}"/>
+              </a:ext>
+            </a:extLst>
+          </p:cNvPr>
+          <p:cNvPicPr>
+            <a:picLocks noChangeAspect="1"/>
+          </p:cNvPicPr>
+          <p:nvPr/>
+        </p:nvPicPr>
+        <p:blipFill rotWithShape="1">
+          <a:blip r:embed="rId8">
+            <a:extLst>
+              <a:ext uri="{28A0092B-C50C-407E-A947-70E740481C1C}">
+                <a14:useLocalDpi xmlns:a14="http://schemas.microsoft.com/office/drawing/2010/main" val="0"/>
+              </a:ext>
+            </a:extLst>
+          </a:blip>
+          <a:srcRect t="20701" b="32849"/>
+          <a:stretch/>
+        </p:blipFill>
+        <p:spPr>
+          <a:xfrm>
+            <a:off x="8581560" y="3081636"/>
+            <a:ext cx="1048025" cy="482438"/>
+          </a:xfrm>
+          <a:prstGeom prst="rect">
+            <a:avLst/>
+          </a:prstGeom>
+        </p:spPr>
+      </p:pic>
+      <p:cxnSp>
+        <p:nvCxnSpPr>
+          <p:cNvPr id="71" name="Conector de Seta Reta 70">
+            <a:extLst>
+              <a:ext uri="{FF2B5EF4-FFF2-40B4-BE49-F238E27FC236}">
+                <a16:creationId xmlns:a16="http://schemas.microsoft.com/office/drawing/2014/main" id="{220B0B33-A9EC-4F93-A8D1-235B86A82B40}"/>
+              </a:ext>
+            </a:extLst>
+          </p:cNvPr>
+          <p:cNvCxnSpPr>
+            <a:cxnSpLocks/>
+          </p:cNvCxnSpPr>
+          <p:nvPr/>
+        </p:nvCxnSpPr>
+        <p:spPr>
+          <a:xfrm flipV="1">
+            <a:off x="6924435" y="3709011"/>
+            <a:ext cx="535590" cy="1"/>
+          </a:xfrm>
+          <a:prstGeom prst="straightConnector1">
+            <a:avLst/>
+          </a:prstGeom>
+          <a:ln w="28575" cmpd="sng">
+            <a:solidFill>
+              <a:schemeClr val="tx1"/>
+            </a:solidFill>
+            <a:prstDash val="sysDash"/>
+            <a:tailEnd type="arrow"/>
+          </a:ln>
+        </p:spPr>
+        <p:style>
+          <a:lnRef idx="1">
+            <a:schemeClr val="accent1"/>
+          </a:lnRef>
+          <a:fillRef idx="0">
+            <a:schemeClr val="accent1"/>
+          </a:fillRef>
+          <a:effectRef idx="0">
+            <a:schemeClr val="accent1"/>
+          </a:effectRef>
+          <a:fontRef idx="minor">
+            <a:schemeClr val="tx1"/>
+          </a:fontRef>
+        </p:style>
+      </p:cxnSp>
+    </p:spTree>
+    <p:extLst>
+      <p:ext uri="{BB962C8B-B14F-4D97-AF65-F5344CB8AC3E}">
+        <p14:creationId xmlns:p14="http://schemas.microsoft.com/office/powerpoint/2010/main" val="2265591422"/>
+      </p:ext>
+    </p:extLst>
+  </p:cSld>
+  <p:clrMapOvr>
+    <a:masterClrMapping/>
+  </p:clrMapOvr>
+</p:sld>
+</file>
+
+<file path=ppt/slides/slide5.xml><?xml version="1.0" encoding="utf-8"?>
+<p:sld xmlns:a="http://schemas.openxmlformats.org/drawingml/2006/main" xmlns:r="http://schemas.openxmlformats.org/officeDocument/2006/relationships" xmlns:p="http://schemas.openxmlformats.org/presentationml/2006/main">
+  <p:cSld>
+    <p:spTree>
+      <p:nvGrpSpPr>
+        <p:cNvPr id="1" name=""/>
+        <p:cNvGrpSpPr/>
+        <p:nvPr/>
+      </p:nvGrpSpPr>
+      <p:grpSpPr>
+        <a:xfrm>
+          <a:off x="0" y="0"/>
+          <a:ext cx="0" cy="0"/>
+          <a:chOff x="0" y="0"/>
+          <a:chExt cx="0" cy="0"/>
+        </a:xfrm>
+      </p:grpSpPr>
+      <p:grpSp>
+        <p:nvGrpSpPr>
+          <p:cNvPr id="82" name="Agrupar 81">
+            <a:extLst>
+              <a:ext uri="{FF2B5EF4-FFF2-40B4-BE49-F238E27FC236}">
+                <a16:creationId xmlns:a16="http://schemas.microsoft.com/office/drawing/2014/main" id="{DC9540FA-7BE5-4838-9C28-C256F4C0C7CB}"/>
+              </a:ext>
+            </a:extLst>
+          </p:cNvPr>
+          <p:cNvGrpSpPr/>
+          <p:nvPr/>
+        </p:nvGrpSpPr>
+        <p:grpSpPr>
+          <a:xfrm>
+            <a:off x="118095" y="257176"/>
+            <a:ext cx="11955810" cy="6950436"/>
+            <a:chOff x="70755" y="167369"/>
+            <a:chExt cx="11955810" cy="6950436"/>
+          </a:xfrm>
+        </p:grpSpPr>
+        <p:grpSp>
+          <p:nvGrpSpPr>
+            <p:cNvPr id="70" name="Agrupar 69">
+              <a:extLst>
+                <a:ext uri="{FF2B5EF4-FFF2-40B4-BE49-F238E27FC236}">
+                  <a16:creationId xmlns:a16="http://schemas.microsoft.com/office/drawing/2014/main" id="{719BE80D-73F9-4BCF-ADA8-E8563FB5E71D}"/>
+                </a:ext>
+              </a:extLst>
+            </p:cNvPr>
+            <p:cNvGrpSpPr/>
+            <p:nvPr/>
+          </p:nvGrpSpPr>
+          <p:grpSpPr>
+            <a:xfrm>
+              <a:off x="280728" y="2367127"/>
+              <a:ext cx="4959851" cy="4750678"/>
+              <a:chOff x="280728" y="2367127"/>
+              <a:chExt cx="4959851" cy="4750678"/>
+            </a:xfrm>
+          </p:grpSpPr>
+          <p:pic>
+            <p:nvPicPr>
+              <p:cNvPr id="35" name="Imagem 34">
+                <a:extLst>
+                  <a:ext uri="{FF2B5EF4-FFF2-40B4-BE49-F238E27FC236}">
+                    <a16:creationId xmlns:a16="http://schemas.microsoft.com/office/drawing/2014/main" id="{460E6642-8724-45C3-8DF4-B6D6A9A119F1}"/>
+                  </a:ext>
+                </a:extLst>
+              </p:cNvPr>
+              <p:cNvPicPr>
+                <a:picLocks noChangeAspect="1"/>
+              </p:cNvPicPr>
+              <p:nvPr/>
+            </p:nvPicPr>
+            <p:blipFill>
+              <a:blip r:embed="rId2">
+                <a:extLst>
+                  <a:ext uri="{28A0092B-C50C-407E-A947-70E740481C1C}">
+                    <a14:useLocalDpi xmlns:a14="http://schemas.microsoft.com/office/drawing/2010/main" val="0"/>
+                  </a:ext>
+                </a:extLst>
+              </a:blip>
+              <a:stretch>
+                <a:fillRect/>
+              </a:stretch>
+            </p:blipFill>
+            <p:spPr>
+              <a:xfrm>
+                <a:off x="280728" y="2367127"/>
+                <a:ext cx="4959851" cy="4750678"/>
+              </a:xfrm>
+              <a:prstGeom prst="rect">
+                <a:avLst/>
+              </a:prstGeom>
+            </p:spPr>
+          </p:pic>
+          <p:grpSp>
+            <p:nvGrpSpPr>
+              <p:cNvPr id="50" name="Agrupar 49">
+                <a:extLst>
+                  <a:ext uri="{FF2B5EF4-FFF2-40B4-BE49-F238E27FC236}">
+                    <a16:creationId xmlns:a16="http://schemas.microsoft.com/office/drawing/2014/main" id="{2F5D4460-A988-40C9-94FA-07520E95E59F}"/>
+                  </a:ext>
+                </a:extLst>
+              </p:cNvPr>
+              <p:cNvGrpSpPr/>
+              <p:nvPr/>
+            </p:nvGrpSpPr>
+            <p:grpSpPr>
+              <a:xfrm>
+                <a:off x="3162799" y="3604911"/>
+                <a:ext cx="1507712" cy="1351935"/>
+                <a:chOff x="3162799" y="3604911"/>
+                <a:chExt cx="1507712" cy="1351935"/>
+              </a:xfrm>
+            </p:grpSpPr>
+            <p:pic>
+              <p:nvPicPr>
+                <p:cNvPr id="46" name="Imagem 45" descr="icon_database">
+                  <a:extLst>
+                    <a:ext uri="{FF2B5EF4-FFF2-40B4-BE49-F238E27FC236}">
+                      <a16:creationId xmlns:a16="http://schemas.microsoft.com/office/drawing/2014/main" id="{2AAB21DD-9A95-4C47-8333-1557052D8152}"/>
+                    </a:ext>
+                  </a:extLst>
+                </p:cNvPr>
+                <p:cNvPicPr>
+                  <a:picLocks noChangeAspect="1"/>
+                </p:cNvPicPr>
+                <p:nvPr/>
+              </p:nvPicPr>
+              <p:blipFill>
+                <a:blip r:embed="rId3">
+                  <a:lum bright="-100000"/>
+                </a:blip>
+                <a:stretch>
+                  <a:fillRect/>
+                </a:stretch>
+              </p:blipFill>
+              <p:spPr>
+                <a:xfrm>
+                  <a:off x="3162799" y="3604911"/>
+                  <a:ext cx="762067" cy="926922"/>
+                </a:xfrm>
+                <a:prstGeom prst="rect">
+                  <a:avLst/>
+                </a:prstGeom>
+              </p:spPr>
+            </p:pic>
+            <p:pic>
+              <p:nvPicPr>
+                <p:cNvPr id="49" name="Imagem 48">
+                  <a:extLst>
+                    <a:ext uri="{FF2B5EF4-FFF2-40B4-BE49-F238E27FC236}">
+                      <a16:creationId xmlns:a16="http://schemas.microsoft.com/office/drawing/2014/main" id="{F1A57FAA-9CE7-4D6C-8284-2203CB317121}"/>
+                    </a:ext>
+                  </a:extLst>
+                </p:cNvPr>
+                <p:cNvPicPr>
+                  <a:picLocks noChangeAspect="1"/>
+                </p:cNvPicPr>
+                <p:nvPr/>
+              </p:nvPicPr>
+              <p:blipFill>
+                <a:blip r:embed="rId4" cstate="print">
+                  <a:extLst>
+                    <a:ext uri="{28A0092B-C50C-407E-A947-70E740481C1C}">
+                      <a14:useLocalDpi xmlns:a14="http://schemas.microsoft.com/office/drawing/2010/main" val="0"/>
+                    </a:ext>
+                  </a:extLst>
+                </a:blip>
+                <a:srcRect/>
+                <a:stretch/>
+              </p:blipFill>
+              <p:spPr>
+                <a:xfrm>
+                  <a:off x="3179221" y="3746523"/>
+                  <a:ext cx="1491290" cy="1210323"/>
+                </a:xfrm>
+                <a:prstGeom prst="rect">
+                  <a:avLst/>
+                </a:prstGeom>
+              </p:spPr>
+            </p:pic>
+          </p:grpSp>
+          <p:pic>
+            <p:nvPicPr>
+              <p:cNvPr id="52" name="Imagem 51">
+                <a:extLst>
+                  <a:ext uri="{FF2B5EF4-FFF2-40B4-BE49-F238E27FC236}">
+                    <a16:creationId xmlns:a16="http://schemas.microsoft.com/office/drawing/2014/main" id="{8C24D198-38AA-4C48-A8B6-9F81A2BED55B}"/>
+                  </a:ext>
+                </a:extLst>
+              </p:cNvPr>
+              <p:cNvPicPr>
+                <a:picLocks noChangeAspect="1"/>
+              </p:cNvPicPr>
+              <p:nvPr/>
+            </p:nvPicPr>
+            <p:blipFill>
+              <a:blip r:embed="rId5">
+                <a:extLst>
+                  <a:ext uri="{28A0092B-C50C-407E-A947-70E740481C1C}">
+                    <a14:useLocalDpi xmlns:a14="http://schemas.microsoft.com/office/drawing/2010/main" val="0"/>
+                  </a:ext>
+                </a:extLst>
+              </a:blip>
+              <a:stretch>
+                <a:fillRect/>
+              </a:stretch>
+            </p:blipFill>
+            <p:spPr>
+              <a:xfrm>
+                <a:off x="942343" y="4068372"/>
+                <a:ext cx="1381459" cy="1381459"/>
+              </a:xfrm>
+              <a:prstGeom prst="rect">
+                <a:avLst/>
+              </a:prstGeom>
+            </p:spPr>
+          </p:pic>
+          <p:pic>
+            <p:nvPicPr>
+              <p:cNvPr id="54" name="Imagem 53">
+                <a:extLst>
+                  <a:ext uri="{FF2B5EF4-FFF2-40B4-BE49-F238E27FC236}">
+                    <a16:creationId xmlns:a16="http://schemas.microsoft.com/office/drawing/2014/main" id="{194F2AA7-3940-4866-ABA9-4448E3B2401A}"/>
+                  </a:ext>
+                </a:extLst>
+              </p:cNvPr>
+              <p:cNvPicPr>
+                <a:picLocks noChangeAspect="1"/>
+              </p:cNvPicPr>
+              <p:nvPr/>
+            </p:nvPicPr>
+            <p:blipFill>
+              <a:blip r:embed="rId6" cstate="print">
+                <a:extLst>
+                  <a:ext uri="{28A0092B-C50C-407E-A947-70E740481C1C}">
+                    <a14:useLocalDpi xmlns:a14="http://schemas.microsoft.com/office/drawing/2010/main" val="0"/>
+                  </a:ext>
+                </a:extLst>
+              </a:blip>
+              <a:stretch>
+                <a:fillRect/>
+              </a:stretch>
+            </p:blipFill>
+            <p:spPr>
+              <a:xfrm>
+                <a:off x="2255399" y="4996070"/>
+                <a:ext cx="1027223" cy="1027223"/>
+              </a:xfrm>
+              <a:prstGeom prst="rect">
+                <a:avLst/>
+              </a:prstGeom>
+            </p:spPr>
+          </p:pic>
+        </p:grpSp>
+        <p:grpSp>
+          <p:nvGrpSpPr>
+            <p:cNvPr id="79" name="Agrupar 78">
+              <a:extLst>
+                <a:ext uri="{FF2B5EF4-FFF2-40B4-BE49-F238E27FC236}">
+                  <a16:creationId xmlns:a16="http://schemas.microsoft.com/office/drawing/2014/main" id="{036A7F85-FC15-4E87-BDD4-E3F1550FC24F}"/>
+                </a:ext>
+              </a:extLst>
+            </p:cNvPr>
+            <p:cNvGrpSpPr/>
+            <p:nvPr/>
+          </p:nvGrpSpPr>
+          <p:grpSpPr>
+            <a:xfrm>
+              <a:off x="70755" y="167369"/>
+              <a:ext cx="11955810" cy="6339567"/>
+              <a:chOff x="70755" y="167369"/>
+              <a:chExt cx="11955810" cy="6339567"/>
+            </a:xfrm>
+          </p:grpSpPr>
+          <p:grpSp>
+            <p:nvGrpSpPr>
+              <p:cNvPr id="4" name="Agrupar 3">
+                <a:extLst>
+                  <a:ext uri="{FF2B5EF4-FFF2-40B4-BE49-F238E27FC236}">
+                    <a16:creationId xmlns:a16="http://schemas.microsoft.com/office/drawing/2014/main" id="{878DE1DE-BC3D-4063-8B14-25C9344C77FD}"/>
+                  </a:ext>
+                </a:extLst>
+              </p:cNvPr>
+              <p:cNvGrpSpPr/>
+              <p:nvPr/>
+            </p:nvGrpSpPr>
+            <p:grpSpPr>
+              <a:xfrm>
+                <a:off x="70757" y="167369"/>
+                <a:ext cx="6110026" cy="1930852"/>
+                <a:chOff x="1948543" y="1939019"/>
+                <a:chExt cx="8411633" cy="2624818"/>
+              </a:xfrm>
+            </p:grpSpPr>
+            <p:grpSp>
+              <p:nvGrpSpPr>
+                <p:cNvPr id="5" name="Agrupar 4">
+                  <a:extLst>
+                    <a:ext uri="{FF2B5EF4-FFF2-40B4-BE49-F238E27FC236}">
+                      <a16:creationId xmlns:a16="http://schemas.microsoft.com/office/drawing/2014/main" id="{97D44B02-D2A1-4F7D-A41B-C2FA14E78FD0}"/>
+                    </a:ext>
+                  </a:extLst>
+                </p:cNvPr>
+                <p:cNvGrpSpPr/>
+                <p:nvPr/>
+              </p:nvGrpSpPr>
+              <p:grpSpPr>
+                <a:xfrm>
+                  <a:off x="1948543" y="1939019"/>
+                  <a:ext cx="8411633" cy="2624818"/>
+                  <a:chOff x="1948543" y="2016580"/>
+                  <a:chExt cx="8411633" cy="2624818"/>
+                </a:xfrm>
+              </p:grpSpPr>
+              <p:sp>
+                <p:nvSpPr>
+                  <p:cNvPr id="7" name="Retângulo arredondado 50">
+                    <a:extLst>
+                      <a:ext uri="{FF2B5EF4-FFF2-40B4-BE49-F238E27FC236}">
+                        <a16:creationId xmlns:a16="http://schemas.microsoft.com/office/drawing/2014/main" id="{166A7AB2-1228-4F71-894D-B2886540C7B4}"/>
+                      </a:ext>
+                    </a:extLst>
+                  </p:cNvPr>
+                  <p:cNvSpPr/>
+                  <p:nvPr/>
+                </p:nvSpPr>
+                <p:spPr>
+                  <a:xfrm>
+                    <a:off x="1948543" y="2016580"/>
+                    <a:ext cx="8294913" cy="2624818"/>
+                  </a:xfrm>
+                  <a:prstGeom prst="roundRect">
+                    <a:avLst/>
+                  </a:prstGeom>
+                  <a:noFill/>
+                  <a:ln w="28575" cmpd="sng">
+                    <a:solidFill>
+                      <a:schemeClr val="tx1"/>
+                    </a:solidFill>
+                    <a:prstDash val="solid"/>
+                  </a:ln>
+                </p:spPr>
+                <p:style>
+                  <a:lnRef idx="2">
+                    <a:schemeClr val="accent1">
+                      <a:shade val="50000"/>
+                    </a:schemeClr>
+                  </a:lnRef>
+                  <a:fillRef idx="1">
+                    <a:schemeClr val="accent1"/>
+                  </a:fillRef>
+                  <a:effectRef idx="0">
+                    <a:schemeClr val="accent1"/>
+                  </a:effectRef>
+                  <a:fontRef idx="minor">
+                    <a:schemeClr val="lt1"/>
+                  </a:fontRef>
+                </p:style>
+                <p:txBody>
+                  <a:bodyPr rtlCol="0" anchor="ctr"/>
+                  <a:lstStyle/>
+                  <a:p>
+                    <a:pPr algn="ctr"/>
+                    <a:endParaRPr lang="pt-BR" altLang="en-US" dirty="0"/>
+                  </a:p>
+                </p:txBody>
+              </p:sp>
+              <p:grpSp>
+                <p:nvGrpSpPr>
+                  <p:cNvPr id="8" name="Agrupar 7">
+                    <a:extLst>
+                      <a:ext uri="{FF2B5EF4-FFF2-40B4-BE49-F238E27FC236}">
+                        <a16:creationId xmlns:a16="http://schemas.microsoft.com/office/drawing/2014/main" id="{CD43C392-574E-4F5B-B2DF-67A046DBDFCF}"/>
+                      </a:ext>
+                    </a:extLst>
+                  </p:cNvPr>
+                  <p:cNvGrpSpPr/>
+                  <p:nvPr/>
+                </p:nvGrpSpPr>
+                <p:grpSpPr>
+                  <a:xfrm>
+                    <a:off x="2160873" y="2539529"/>
+                    <a:ext cx="7870253" cy="1769719"/>
+                    <a:chOff x="2160873" y="2539529"/>
+                    <a:chExt cx="7870253" cy="1769719"/>
+                  </a:xfrm>
+                </p:grpSpPr>
+                <p:pic>
+                  <p:nvPicPr>
+                    <p:cNvPr id="11" name="Imagem 10">
+                      <a:extLst>
+                        <a:ext uri="{FF2B5EF4-FFF2-40B4-BE49-F238E27FC236}">
+                          <a16:creationId xmlns:a16="http://schemas.microsoft.com/office/drawing/2014/main" id="{A39C3845-7E6E-4F43-92F3-286FF6FF622F}"/>
+                        </a:ext>
+                      </a:extLst>
+                    </p:cNvPr>
+                    <p:cNvPicPr>
+                      <a:picLocks noChangeAspect="1"/>
+                    </p:cNvPicPr>
+                    <p:nvPr/>
+                  </p:nvPicPr>
+                  <p:blipFill rotWithShape="1">
+                    <a:blip r:embed="rId7" cstate="print">
+                      <a:extLst>
+                        <a:ext uri="{BEBA8EAE-BF5A-486C-A8C5-ECC9F3942E4B}">
+                          <a14:imgProps xmlns:a14="http://schemas.microsoft.com/office/drawing/2010/main">
+                            <a14:imgLayer r:embed="rId8">
+                              <a14:imgEffect>
+                                <a14:backgroundRemoval t="21852" b="77870" l="30400" r="71000">
+                                  <a14:foregroundMark x1="50300" y1="35926" x2="50300" y2="35926"/>
+                                  <a14:foregroundMark x1="39700" y1="33056" x2="44500" y2="31204"/>
+                                  <a14:foregroundMark x1="45700" y1="30833" x2="49900" y2="30278"/>
+                                  <a14:foregroundMark x1="51700" y1="30463" x2="55200" y2="30648"/>
+                                  <a14:foregroundMark x1="36200" y1="27222" x2="41000" y2="25278"/>
+                                  <a14:foregroundMark x1="43500" y1="56296" x2="50300" y2="56852"/>
+                                  <a14:foregroundMark x1="45300" y1="72593" x2="45300" y2="72593"/>
+                                  <a14:foregroundMark x1="48000" y1="73241" x2="48000" y2="73241"/>
+                                  <a14:foregroundMark x1="50800" y1="73426" x2="50800" y2="73426"/>
+                                  <a14:foregroundMark x1="53000" y1="73981" x2="53000" y2="73981"/>
+                                  <a14:foregroundMark x1="55800" y1="73704" x2="55800" y2="73704"/>
+                                  <a14:foregroundMark x1="44600" y1="74259" x2="44600" y2="74259"/>
+                                  <a14:backgroundMark x1="53700" y1="73981" x2="53700" y2="73981"/>
+                                  <a14:backgroundMark x1="56500" y1="73056" x2="56500" y2="73056"/>
+                                </a14:backgroundRemoval>
+                              </a14:imgEffect>
+                            </a14:imgLayer>
+                          </a14:imgProps>
+                        </a:ext>
+                        <a:ext uri="{28A0092B-C50C-407E-A947-70E740481C1C}">
+                          <a14:useLocalDpi xmlns:a14="http://schemas.microsoft.com/office/drawing/2010/main" val="0"/>
+                        </a:ext>
+                      </a:extLst>
+                    </a:blip>
+                    <a:srcRect l="30757" t="69152" r="26553" b="23094"/>
+                    <a:stretch/>
+                  </p:blipFill>
+                  <p:spPr>
+                    <a:xfrm>
+                      <a:off x="2160873" y="3969427"/>
+                      <a:ext cx="1570206" cy="308050"/>
+                    </a:xfrm>
+                    <a:prstGeom prst="rect">
+                      <a:avLst/>
+                    </a:prstGeom>
+                  </p:spPr>
+                </p:pic>
+                <p:grpSp>
+                  <p:nvGrpSpPr>
+                    <p:cNvPr id="12" name="Agrupar 11">
+                      <a:extLst>
+                        <a:ext uri="{FF2B5EF4-FFF2-40B4-BE49-F238E27FC236}">
+                          <a16:creationId xmlns:a16="http://schemas.microsoft.com/office/drawing/2014/main" id="{74A51819-BFD5-403C-8A87-EB7E1082CA6A}"/>
+                        </a:ext>
+                      </a:extLst>
+                    </p:cNvPr>
+                    <p:cNvGrpSpPr/>
+                    <p:nvPr/>
+                  </p:nvGrpSpPr>
+                  <p:grpSpPr>
+                    <a:xfrm>
+                      <a:off x="7821385" y="2651505"/>
+                      <a:ext cx="2209741" cy="1543050"/>
+                      <a:chOff x="7669044" y="2669721"/>
+                      <a:chExt cx="2209741" cy="1543050"/>
+                    </a:xfrm>
+                  </p:grpSpPr>
+                  <p:pic>
+                    <p:nvPicPr>
+                      <p:cNvPr id="17" name="Imagem 16">
+                        <a:extLst>
+                          <a:ext uri="{FF2B5EF4-FFF2-40B4-BE49-F238E27FC236}">
+                            <a16:creationId xmlns:a16="http://schemas.microsoft.com/office/drawing/2014/main" id="{CB01797E-A91A-4FFD-AA2B-28F7A4F2DD09}"/>
+                          </a:ext>
+                        </a:extLst>
+                      </p:cNvPr>
+                      <p:cNvPicPr>
+                        <a:picLocks noChangeAspect="1"/>
+                      </p:cNvPicPr>
+                      <p:nvPr/>
+                    </p:nvPicPr>
+                    <p:blipFill rotWithShape="1">
+                      <a:blip r:embed="rId9">
+                        <a:extLst>
+                          <a:ext uri="{28A0092B-C50C-407E-A947-70E740481C1C}">
+                            <a14:useLocalDpi xmlns:a14="http://schemas.microsoft.com/office/drawing/2010/main" val="0"/>
+                          </a:ext>
+                        </a:extLst>
+                      </a:blip>
+                      <a:srcRect l="4378" t="7096" r="5364" b="5712"/>
+                      <a:stretch/>
+                    </p:blipFill>
+                    <p:spPr>
+                      <a:xfrm>
+                        <a:off x="7669044" y="2669721"/>
+                        <a:ext cx="2209741" cy="1543050"/>
+                      </a:xfrm>
+                      <a:prstGeom prst="rect">
+                        <a:avLst/>
+                      </a:prstGeom>
+                    </p:spPr>
+                  </p:pic>
+                  <p:pic>
+                    <p:nvPicPr>
+                      <p:cNvPr id="18" name="Imagem 17">
+                        <a:extLst>
+                          <a:ext uri="{FF2B5EF4-FFF2-40B4-BE49-F238E27FC236}">
+                            <a16:creationId xmlns:a16="http://schemas.microsoft.com/office/drawing/2014/main" id="{304E74CF-4952-48FD-8218-D21EFD7C92A4}"/>
+                          </a:ext>
+                        </a:extLst>
+                      </p:cNvPr>
+                      <p:cNvPicPr>
+                        <a:picLocks noChangeAspect="1"/>
+                      </p:cNvPicPr>
+                      <p:nvPr/>
+                    </p:nvPicPr>
+                    <p:blipFill rotWithShape="1">
+                      <a:blip r:embed="rId5">
+                        <a:extLst>
+                          <a:ext uri="{28A0092B-C50C-407E-A947-70E740481C1C}">
+                            <a14:useLocalDpi xmlns:a14="http://schemas.microsoft.com/office/drawing/2010/main" val="0"/>
+                          </a:ext>
+                        </a:extLst>
+                      </a:blip>
+                      <a:srcRect t="20701" b="32849"/>
+                      <a:stretch/>
+                    </p:blipFill>
+                    <p:spPr>
+                      <a:xfrm>
+                        <a:off x="8485947" y="2886596"/>
+                        <a:ext cx="1152820" cy="524016"/>
+                      </a:xfrm>
+                      <a:prstGeom prst="rect">
+                        <a:avLst/>
+                      </a:prstGeom>
+                    </p:spPr>
+                  </p:pic>
+                </p:grpSp>
+                <p:grpSp>
+                  <p:nvGrpSpPr>
+                    <p:cNvPr id="13" name="Agrupar 12">
+                      <a:extLst>
+                        <a:ext uri="{FF2B5EF4-FFF2-40B4-BE49-F238E27FC236}">
+                          <a16:creationId xmlns:a16="http://schemas.microsoft.com/office/drawing/2014/main" id="{D31F9704-CA69-4685-ADB5-7510CB57616D}"/>
+                        </a:ext>
+                      </a:extLst>
+                    </p:cNvPr>
+                    <p:cNvGrpSpPr/>
+                    <p:nvPr/>
+                  </p:nvGrpSpPr>
+                  <p:grpSpPr>
+                    <a:xfrm>
+                      <a:off x="3641104" y="2539529"/>
+                      <a:ext cx="4180281" cy="1769719"/>
+                      <a:chOff x="3641104" y="2539529"/>
+                      <a:chExt cx="4180281" cy="1769719"/>
+                    </a:xfrm>
+                  </p:grpSpPr>
+                  <p:pic>
+                    <p:nvPicPr>
+                      <p:cNvPr id="14" name="Imagem 13">
+                        <a:extLst>
+                          <a:ext uri="{FF2B5EF4-FFF2-40B4-BE49-F238E27FC236}">
+                            <a16:creationId xmlns:a16="http://schemas.microsoft.com/office/drawing/2014/main" id="{530E4512-3A3C-4E70-875D-36824CBF6CC2}"/>
+                          </a:ext>
+                        </a:extLst>
+                      </p:cNvPr>
+                      <p:cNvPicPr>
+                        <a:picLocks noChangeAspect="1"/>
+                      </p:cNvPicPr>
+                      <p:nvPr/>
+                    </p:nvPicPr>
+                    <p:blipFill>
+                      <a:blip r:embed="rId10" cstate="print">
+                        <a:extLst>
+                          <a:ext uri="{28A0092B-C50C-407E-A947-70E740481C1C}">
+                            <a14:useLocalDpi xmlns:a14="http://schemas.microsoft.com/office/drawing/2010/main" val="0"/>
+                          </a:ext>
+                        </a:extLst>
+                      </a:blip>
+                      <a:stretch>
+                        <a:fillRect/>
+                      </a:stretch>
+                    </p:blipFill>
+                    <p:spPr>
+                      <a:xfrm>
+                        <a:off x="4699861" y="2539529"/>
+                        <a:ext cx="2317381" cy="1769719"/>
+                      </a:xfrm>
+                      <a:prstGeom prst="rect">
+                        <a:avLst/>
+                      </a:prstGeom>
+                    </p:spPr>
+                  </p:pic>
+                  <p:cxnSp>
+                    <p:nvCxnSpPr>
+                      <p:cNvPr id="15" name="Conector de Seta Reta 14">
+                        <a:extLst>
+                          <a:ext uri="{FF2B5EF4-FFF2-40B4-BE49-F238E27FC236}">
+                            <a16:creationId xmlns:a16="http://schemas.microsoft.com/office/drawing/2014/main" id="{3843516F-45DA-4D29-B594-6AA6E1191197}"/>
+                          </a:ext>
+                        </a:extLst>
+                      </p:cNvPr>
+                      <p:cNvCxnSpPr>
+                        <a:cxnSpLocks/>
+                        <a:stCxn id="14" idx="3"/>
+                        <a:endCxn id="17" idx="1"/>
+                      </p:cNvCxnSpPr>
+                      <p:nvPr/>
+                    </p:nvCxnSpPr>
+                    <p:spPr>
+                      <a:xfrm flipV="1">
+                        <a:off x="7017242" y="3423030"/>
+                        <a:ext cx="804143" cy="1359"/>
+                      </a:xfrm>
+                      <a:prstGeom prst="straightConnector1">
+                        <a:avLst/>
+                      </a:prstGeom>
+                      <a:ln w="28575" cmpd="sng">
+                        <a:solidFill>
+                          <a:schemeClr val="tx1"/>
+                        </a:solidFill>
+                        <a:prstDash val="sysDash"/>
+                        <a:tailEnd type="arrow"/>
+                      </a:ln>
+                    </p:spPr>
+                    <p:style>
+                      <a:lnRef idx="1">
+                        <a:schemeClr val="accent1"/>
+                      </a:lnRef>
+                      <a:fillRef idx="0">
+                        <a:schemeClr val="accent1"/>
+                      </a:fillRef>
+                      <a:effectRef idx="0">
+                        <a:schemeClr val="accent1"/>
+                      </a:effectRef>
+                      <a:fontRef idx="minor">
+                        <a:schemeClr val="tx1"/>
+                      </a:fontRef>
+                    </p:style>
+                  </p:cxnSp>
+                  <p:cxnSp>
+                    <p:nvCxnSpPr>
+                      <p:cNvPr id="16" name="Conector de Seta Reta 15">
+                        <a:extLst>
+                          <a:ext uri="{FF2B5EF4-FFF2-40B4-BE49-F238E27FC236}">
+                            <a16:creationId xmlns:a16="http://schemas.microsoft.com/office/drawing/2014/main" id="{1DCCE984-010F-47A4-82C1-C8FBD7A68CB1}"/>
+                          </a:ext>
+                        </a:extLst>
+                      </p:cNvPr>
+                      <p:cNvCxnSpPr>
+                        <a:cxnSpLocks/>
+                        <a:endCxn id="14" idx="1"/>
+                      </p:cNvCxnSpPr>
+                      <p:nvPr/>
+                    </p:nvCxnSpPr>
+                    <p:spPr>
+                      <a:xfrm>
+                        <a:off x="3641104" y="3424389"/>
+                        <a:ext cx="1058757" cy="0"/>
+                      </a:xfrm>
+                      <a:prstGeom prst="straightConnector1">
+                        <a:avLst/>
+                      </a:prstGeom>
+                      <a:ln w="28575" cmpd="sng">
+                        <a:solidFill>
+                          <a:schemeClr val="tx1"/>
+                        </a:solidFill>
+                        <a:prstDash val="sysDash"/>
+                        <a:tailEnd type="arrow"/>
+                      </a:ln>
+                    </p:spPr>
+                    <p:style>
+                      <a:lnRef idx="1">
+                        <a:schemeClr val="accent1"/>
+                      </a:lnRef>
+                      <a:fillRef idx="0">
+                        <a:schemeClr val="accent1"/>
+                      </a:fillRef>
+                      <a:effectRef idx="0">
+                        <a:schemeClr val="accent1"/>
+                      </a:effectRef>
+                      <a:fontRef idx="minor">
+                        <a:schemeClr val="tx1"/>
+                      </a:fontRef>
+                    </p:style>
+                  </p:cxnSp>
+                </p:grpSp>
+              </p:grpSp>
+              <p:sp>
+                <p:nvSpPr>
+                  <p:cNvPr id="9" name="CaixaDeTexto 8">
+                    <a:extLst>
+                      <a:ext uri="{FF2B5EF4-FFF2-40B4-BE49-F238E27FC236}">
+                        <a16:creationId xmlns:a16="http://schemas.microsoft.com/office/drawing/2014/main" id="{21BC4FE9-68AA-4A99-ADAD-8FF6F247579D}"/>
+                      </a:ext>
+                    </a:extLst>
+                  </p:cNvPr>
+                  <p:cNvSpPr txBox="1"/>
+                  <p:nvPr/>
+                </p:nvSpPr>
+                <p:spPr>
+                  <a:xfrm>
+                    <a:off x="9182526" y="2065918"/>
+                    <a:ext cx="1177650" cy="418395"/>
+                  </a:xfrm>
+                  <a:prstGeom prst="rect">
+                    <a:avLst/>
+                  </a:prstGeom>
+                  <a:noFill/>
+                </p:spPr>
+                <p:txBody>
+                  <a:bodyPr wrap="square" rtlCol="0">
+                    <a:spAutoFit/>
+                  </a:bodyPr>
+                  <a:lstStyle/>
+                  <a:p>
+                    <a:r>
+                      <a:rPr lang="pt-BR" sz="1400" b="1" dirty="0">
+                        <a:latin typeface="+mj-lt"/>
+                      </a:rPr>
+                      <a:t>Local</a:t>
+                    </a:r>
+                  </a:p>
+                </p:txBody>
+              </p:sp>
+              <p:sp>
+                <p:nvSpPr>
+                  <p:cNvPr id="10" name="CaixaDeTexto 9">
+                    <a:extLst>
+                      <a:ext uri="{FF2B5EF4-FFF2-40B4-BE49-F238E27FC236}">
+                        <a16:creationId xmlns:a16="http://schemas.microsoft.com/office/drawing/2014/main" id="{1DFCE42B-53AB-4A57-9AC5-F7ABE714A789}"/>
+                      </a:ext>
+                    </a:extLst>
+                  </p:cNvPr>
+                  <p:cNvSpPr txBox="1"/>
+                  <p:nvPr/>
+                </p:nvSpPr>
+                <p:spPr>
+                  <a:xfrm>
+                    <a:off x="4837434" y="2066220"/>
+                    <a:ext cx="2517129" cy="418395"/>
+                  </a:xfrm>
+                  <a:prstGeom prst="rect">
+                    <a:avLst/>
+                  </a:prstGeom>
+                  <a:noFill/>
+                </p:spPr>
+                <p:txBody>
+                  <a:bodyPr wrap="square" rtlCol="0">
+                    <a:spAutoFit/>
+                  </a:bodyPr>
+                  <a:lstStyle/>
+                  <a:p>
+                    <a:r>
+                      <a:rPr lang="pt-BR" sz="1400" b="1" dirty="0">
+                        <a:latin typeface="+mj-lt"/>
+                      </a:rPr>
+                      <a:t>Sensor Virtual</a:t>
+                    </a:r>
+                  </a:p>
+                </p:txBody>
+              </p:sp>
+            </p:grpSp>
+            <p:pic>
+              <p:nvPicPr>
+                <p:cNvPr id="6" name="Imagem 5">
+                  <a:extLst>
+                    <a:ext uri="{FF2B5EF4-FFF2-40B4-BE49-F238E27FC236}">
+                      <a16:creationId xmlns:a16="http://schemas.microsoft.com/office/drawing/2014/main" id="{2D6C8577-A497-4BD5-9B29-ED7FAE2A7991}"/>
+                    </a:ext>
+                  </a:extLst>
+                </p:cNvPr>
+                <p:cNvPicPr>
+                  <a:picLocks noChangeAspect="1"/>
+                </p:cNvPicPr>
+                <p:nvPr/>
+              </p:nvPicPr>
+              <p:blipFill rotWithShape="1">
+                <a:blip r:embed="rId11" cstate="print">
+                  <a:extLst>
+                    <a:ext uri="{BEBA8EAE-BF5A-486C-A8C5-ECC9F3942E4B}">
+                      <a14:imgProps xmlns:a14="http://schemas.microsoft.com/office/drawing/2010/main">
+                        <a14:imgLayer r:embed="rId12">
+                          <a14:imgEffect>
+                            <a14:backgroundRemoval t="21852" b="77870" l="30400" r="71000">
+                              <a14:foregroundMark x1="50300" y1="35926" x2="50300" y2="35926"/>
+                              <a14:foregroundMark x1="39700" y1="33056" x2="44500" y2="31204"/>
+                              <a14:foregroundMark x1="45700" y1="30833" x2="49900" y2="30278"/>
+                              <a14:foregroundMark x1="51700" y1="30463" x2="55200" y2="30648"/>
+                              <a14:foregroundMark x1="36200" y1="27222" x2="41000" y2="25278"/>
+                              <a14:foregroundMark x1="43500" y1="56296" x2="50300" y2="56852"/>
+                              <a14:foregroundMark x1="45300" y1="72593" x2="45300" y2="72593"/>
+                              <a14:foregroundMark x1="48000" y1="73241" x2="48000" y2="73241"/>
+                              <a14:foregroundMark x1="50800" y1="73426" x2="50800" y2="73426"/>
+                              <a14:foregroundMark x1="53000" y1="73981" x2="53000" y2="73981"/>
+                              <a14:foregroundMark x1="55800" y1="73704" x2="55800" y2="73704"/>
+                              <a14:foregroundMark x1="44600" y1="74259" x2="44600" y2="74259"/>
+                              <a14:backgroundMark x1="53700" y1="73981" x2="53700" y2="73981"/>
+                              <a14:backgroundMark x1="56500" y1="73056" x2="56500" y2="73056"/>
+                            </a14:backgroundRemoval>
+                          </a14:imgEffect>
+                        </a14:imgLayer>
+                      </a14:imgProps>
+                    </a:ext>
+                    <a:ext uri="{28A0092B-C50C-407E-A947-70E740481C1C}">
+                      <a14:useLocalDpi xmlns:a14="http://schemas.microsoft.com/office/drawing/2010/main" val="0"/>
+                    </a:ext>
+                  </a:extLst>
+                </a:blip>
+                <a:srcRect l="30757" t="21786" r="29000" b="33665"/>
+                <a:stretch/>
+              </p:blipFill>
+              <p:spPr>
+                <a:xfrm>
+                  <a:off x="2160873" y="2276172"/>
+                  <a:ext cx="1480230" cy="1769719"/>
+                </a:xfrm>
+                <a:prstGeom prst="rect">
+                  <a:avLst/>
+                </a:prstGeom>
+              </p:spPr>
+            </p:pic>
+          </p:grpSp>
+          <p:sp>
+            <p:nvSpPr>
+              <p:cNvPr id="19" name="Retângulo arredondado 50">
+                <a:extLst>
+                  <a:ext uri="{FF2B5EF4-FFF2-40B4-BE49-F238E27FC236}">
+                    <a16:creationId xmlns:a16="http://schemas.microsoft.com/office/drawing/2014/main" id="{B2088FF4-0C9A-41C5-86E9-CD021C87CE42}"/>
+                  </a:ext>
+                </a:extLst>
+              </p:cNvPr>
+              <p:cNvSpPr/>
+              <p:nvPr/>
+            </p:nvSpPr>
+            <p:spPr>
+              <a:xfrm>
+                <a:off x="70755" y="2565280"/>
+                <a:ext cx="6025243" cy="3941656"/>
+              </a:xfrm>
+              <a:prstGeom prst="roundRect">
+                <a:avLst/>
+              </a:prstGeom>
+              <a:noFill/>
+              <a:ln w="28575" cmpd="sng">
+                <a:solidFill>
+                  <a:schemeClr val="tx1"/>
+                </a:solidFill>
+                <a:prstDash val="solid"/>
+              </a:ln>
+            </p:spPr>
+            <p:style>
+              <a:lnRef idx="2">
+                <a:schemeClr val="accent1">
+                  <a:shade val="50000"/>
+                </a:schemeClr>
+              </a:lnRef>
+              <a:fillRef idx="1">
+                <a:schemeClr val="accent1"/>
+              </a:fillRef>
+              <a:effectRef idx="0">
+                <a:schemeClr val="accent1"/>
+              </a:effectRef>
+              <a:fontRef idx="minor">
+                <a:schemeClr val="lt1"/>
+              </a:fontRef>
+            </p:style>
+            <p:txBody>
+              <a:bodyPr rtlCol="0" anchor="ctr"/>
+              <a:lstStyle/>
+              <a:p>
+                <a:pPr algn="ctr"/>
+                <a:endParaRPr lang="pt-BR" altLang="en-US" dirty="0"/>
+              </a:p>
+            </p:txBody>
+          </p:sp>
+          <p:sp>
+            <p:nvSpPr>
+              <p:cNvPr id="21" name="CaixaDeTexto 20">
+                <a:extLst>
+                  <a:ext uri="{FF2B5EF4-FFF2-40B4-BE49-F238E27FC236}">
+                    <a16:creationId xmlns:a16="http://schemas.microsoft.com/office/drawing/2014/main" id="{DD2E2F45-82D3-4CCD-A6DE-E86EC8744FEA}"/>
+                  </a:ext>
+                </a:extLst>
+              </p:cNvPr>
+              <p:cNvSpPr txBox="1"/>
+              <p:nvPr/>
+            </p:nvSpPr>
+            <p:spPr>
+              <a:xfrm>
+                <a:off x="5240579" y="2694005"/>
+                <a:ext cx="855419" cy="307777"/>
+              </a:xfrm>
+              <a:prstGeom prst="rect">
+                <a:avLst/>
+              </a:prstGeom>
+              <a:noFill/>
+            </p:spPr>
+            <p:txBody>
+              <a:bodyPr wrap="square" rtlCol="0">
+                <a:spAutoFit/>
+              </a:bodyPr>
+              <a:lstStyle/>
+              <a:p>
+                <a:r>
+                  <a:rPr lang="pt-BR" sz="1400" b="1" dirty="0">
+                    <a:latin typeface="+mj-lt"/>
+                  </a:rPr>
+                  <a:t>Cloud</a:t>
+                </a:r>
+              </a:p>
+            </p:txBody>
+          </p:sp>
+          <p:cxnSp>
+            <p:nvCxnSpPr>
+              <p:cNvPr id="22" name="Conector de Seta Reta 21">
+                <a:extLst>
+                  <a:ext uri="{FF2B5EF4-FFF2-40B4-BE49-F238E27FC236}">
+                    <a16:creationId xmlns:a16="http://schemas.microsoft.com/office/drawing/2014/main" id="{91E3B499-98D4-47AB-A77F-C109053568E6}"/>
+                  </a:ext>
+                </a:extLst>
+              </p:cNvPr>
+              <p:cNvCxnSpPr>
+                <a:cxnSpLocks/>
+                <a:stCxn id="17" idx="2"/>
+              </p:cNvCxnSpPr>
+              <p:nvPr/>
+            </p:nvCxnSpPr>
+            <p:spPr>
+              <a:xfrm>
+                <a:off x="5139215" y="1769516"/>
+                <a:ext cx="0" cy="1047163"/>
+              </a:xfrm>
+              <a:prstGeom prst="straightConnector1">
+                <a:avLst/>
+              </a:prstGeom>
+              <a:ln w="28575" cmpd="sng">
+                <a:solidFill>
+                  <a:schemeClr val="tx1"/>
+                </a:solidFill>
+                <a:prstDash val="sysDash"/>
+                <a:tailEnd type="arrow"/>
+              </a:ln>
+            </p:spPr>
+            <p:style>
+              <a:lnRef idx="1">
+                <a:schemeClr val="accent1"/>
+              </a:lnRef>
+              <a:fillRef idx="0">
+                <a:schemeClr val="accent1"/>
+              </a:fillRef>
+              <a:effectRef idx="0">
+                <a:schemeClr val="accent1"/>
+              </a:effectRef>
+              <a:fontRef idx="minor">
+                <a:schemeClr val="tx1"/>
+              </a:fontRef>
+            </p:style>
+          </p:cxnSp>
+          <p:sp>
+            <p:nvSpPr>
+              <p:cNvPr id="27" name="CaixaDeTexto 26">
+                <a:extLst>
+                  <a:ext uri="{FF2B5EF4-FFF2-40B4-BE49-F238E27FC236}">
+                    <a16:creationId xmlns:a16="http://schemas.microsoft.com/office/drawing/2014/main" id="{3E088906-E52B-4140-B5BB-9AD9F8327DA0}"/>
+                  </a:ext>
+                </a:extLst>
+              </p:cNvPr>
+              <p:cNvSpPr txBox="1"/>
+              <p:nvPr/>
+            </p:nvSpPr>
+            <p:spPr>
+              <a:xfrm>
+                <a:off x="5102114" y="1796614"/>
+                <a:ext cx="493235" cy="261610"/>
+              </a:xfrm>
+              <a:prstGeom prst="rect">
+                <a:avLst/>
+              </a:prstGeom>
+              <a:noFill/>
+            </p:spPr>
+            <p:txBody>
+              <a:bodyPr wrap="square" rtlCol="0">
+                <a:spAutoFit/>
+              </a:bodyPr>
+              <a:lstStyle/>
+              <a:p>
+                <a:r>
+                  <a:rPr lang="pt-BR" sz="1100" dirty="0"/>
+                  <a:t>API</a:t>
+                </a:r>
+              </a:p>
+            </p:txBody>
+          </p:sp>
+          <p:pic>
+            <p:nvPicPr>
+              <p:cNvPr id="29" name="Imagem 28">
+                <a:extLst>
+                  <a:ext uri="{FF2B5EF4-FFF2-40B4-BE49-F238E27FC236}">
+                    <a16:creationId xmlns:a16="http://schemas.microsoft.com/office/drawing/2014/main" id="{372E2E04-86E1-4681-9CDE-88604A697242}"/>
+                  </a:ext>
+                </a:extLst>
+              </p:cNvPr>
+              <p:cNvPicPr>
+                <a:picLocks noChangeAspect="1"/>
+              </p:cNvPicPr>
+              <p:nvPr/>
+            </p:nvPicPr>
+            <p:blipFill>
+              <a:blip r:embed="rId13" cstate="print">
+                <a:extLst>
+                  <a:ext uri="{28A0092B-C50C-407E-A947-70E740481C1C}">
+                    <a14:useLocalDpi xmlns:a14="http://schemas.microsoft.com/office/drawing/2010/main" val="0"/>
+                  </a:ext>
+                </a:extLst>
+              </a:blip>
+              <a:stretch>
+                <a:fillRect/>
+              </a:stretch>
+            </p:blipFill>
+            <p:spPr>
+              <a:xfrm>
+                <a:off x="3805454" y="2596807"/>
+                <a:ext cx="1417414" cy="809951"/>
+              </a:xfrm>
+              <a:prstGeom prst="rect">
+                <a:avLst/>
+              </a:prstGeom>
+            </p:spPr>
+          </p:pic>
+          <p:sp>
+            <p:nvSpPr>
+              <p:cNvPr id="55" name="Retângulo arredondado 50">
+                <a:extLst>
+                  <a:ext uri="{FF2B5EF4-FFF2-40B4-BE49-F238E27FC236}">
+                    <a16:creationId xmlns:a16="http://schemas.microsoft.com/office/drawing/2014/main" id="{C38B4AE0-0EC1-46E1-A309-B5E54D53385A}"/>
+                  </a:ext>
+                </a:extLst>
+              </p:cNvPr>
+              <p:cNvSpPr/>
+              <p:nvPr/>
+            </p:nvSpPr>
+            <p:spPr>
+              <a:xfrm>
+                <a:off x="6753093" y="2849714"/>
+                <a:ext cx="5273472" cy="3003940"/>
+              </a:xfrm>
+              <a:prstGeom prst="roundRect">
+                <a:avLst/>
+              </a:prstGeom>
+              <a:noFill/>
+              <a:ln w="28575" cmpd="sng">
+                <a:solidFill>
+                  <a:schemeClr val="tx1"/>
+                </a:solidFill>
+                <a:prstDash val="solid"/>
+              </a:ln>
+            </p:spPr>
+            <p:style>
+              <a:lnRef idx="2">
+                <a:schemeClr val="accent1">
+                  <a:shade val="50000"/>
+                </a:schemeClr>
+              </a:lnRef>
+              <a:fillRef idx="1">
+                <a:schemeClr val="accent1"/>
+              </a:fillRef>
+              <a:effectRef idx="0">
+                <a:schemeClr val="accent1"/>
+              </a:effectRef>
+              <a:fontRef idx="minor">
+                <a:schemeClr val="lt1"/>
+              </a:fontRef>
+            </p:style>
+            <p:txBody>
+              <a:bodyPr rtlCol="0" anchor="ctr"/>
+              <a:lstStyle/>
+              <a:p>
+                <a:pPr algn="ctr"/>
+                <a:endParaRPr lang="pt-BR" altLang="en-US" dirty="0"/>
+              </a:p>
+            </p:txBody>
+          </p:sp>
+          <p:cxnSp>
+            <p:nvCxnSpPr>
+              <p:cNvPr id="56" name="Conector de Seta Reta 55">
+                <a:extLst>
+                  <a:ext uri="{FF2B5EF4-FFF2-40B4-BE49-F238E27FC236}">
+                    <a16:creationId xmlns:a16="http://schemas.microsoft.com/office/drawing/2014/main" id="{79CEC7DC-B7BB-4850-81F4-15414FE03C99}"/>
+                  </a:ext>
+                </a:extLst>
+              </p:cNvPr>
+              <p:cNvCxnSpPr>
+                <a:cxnSpLocks/>
+              </p:cNvCxnSpPr>
+              <p:nvPr/>
+            </p:nvCxnSpPr>
+            <p:spPr>
+              <a:xfrm>
+                <a:off x="5987984" y="4556859"/>
+                <a:ext cx="1008809" cy="0"/>
+              </a:xfrm>
+              <a:prstGeom prst="straightConnector1">
+                <a:avLst/>
+              </a:prstGeom>
+              <a:ln w="28575" cmpd="sng">
+                <a:solidFill>
+                  <a:schemeClr val="tx1"/>
+                </a:solidFill>
+                <a:prstDash val="sysDash"/>
+                <a:tailEnd type="arrow"/>
+              </a:ln>
+            </p:spPr>
+            <p:style>
+              <a:lnRef idx="1">
+                <a:schemeClr val="accent1"/>
+              </a:lnRef>
+              <a:fillRef idx="0">
+                <a:schemeClr val="accent1"/>
+              </a:fillRef>
+              <a:effectRef idx="0">
+                <a:schemeClr val="accent1"/>
+              </a:effectRef>
+              <a:fontRef idx="minor">
+                <a:schemeClr val="tx1"/>
+              </a:fontRef>
+            </p:style>
+          </p:cxnSp>
+          <p:sp>
+            <p:nvSpPr>
+              <p:cNvPr id="62" name="CaixaDeTexto 61">
+                <a:extLst>
+                  <a:ext uri="{FF2B5EF4-FFF2-40B4-BE49-F238E27FC236}">
+                    <a16:creationId xmlns:a16="http://schemas.microsoft.com/office/drawing/2014/main" id="{7298DBB2-30D4-4C62-B080-C08316E37037}"/>
+                  </a:ext>
+                </a:extLst>
+              </p:cNvPr>
+              <p:cNvSpPr txBox="1"/>
+              <p:nvPr/>
+            </p:nvSpPr>
+            <p:spPr>
+              <a:xfrm>
+                <a:off x="11055853" y="2920139"/>
+                <a:ext cx="855419" cy="307777"/>
+              </a:xfrm>
+              <a:prstGeom prst="rect">
+                <a:avLst/>
+              </a:prstGeom>
+              <a:noFill/>
+            </p:spPr>
+            <p:txBody>
+              <a:bodyPr wrap="square" rtlCol="0">
+                <a:spAutoFit/>
+              </a:bodyPr>
+              <a:lstStyle/>
+              <a:p>
+                <a:r>
+                  <a:rPr lang="pt-BR" sz="1400" b="1" dirty="0">
+                    <a:latin typeface="+mj-lt"/>
+                  </a:rPr>
+                  <a:t>Usuário</a:t>
+                </a:r>
+              </a:p>
+            </p:txBody>
+          </p:sp>
+          <p:grpSp>
+            <p:nvGrpSpPr>
+              <p:cNvPr id="68" name="Agrupar 67">
+                <a:extLst>
+                  <a:ext uri="{FF2B5EF4-FFF2-40B4-BE49-F238E27FC236}">
+                    <a16:creationId xmlns:a16="http://schemas.microsoft.com/office/drawing/2014/main" id="{7085491E-FFE0-4120-81F7-41EB84C9A77E}"/>
+                  </a:ext>
+                </a:extLst>
+              </p:cNvPr>
+              <p:cNvGrpSpPr/>
+              <p:nvPr/>
+            </p:nvGrpSpPr>
+            <p:grpSpPr>
+              <a:xfrm>
+                <a:off x="7015931" y="2920139"/>
+                <a:ext cx="2711431" cy="1826733"/>
+                <a:chOff x="7015931" y="2920139"/>
+                <a:chExt cx="2711431" cy="1826733"/>
+              </a:xfrm>
+            </p:grpSpPr>
+            <p:pic>
+              <p:nvPicPr>
+                <p:cNvPr id="64" name="Imagem 63" descr="icon_pc">
+                  <a:extLst>
+                    <a:ext uri="{FF2B5EF4-FFF2-40B4-BE49-F238E27FC236}">
+                      <a16:creationId xmlns:a16="http://schemas.microsoft.com/office/drawing/2014/main" id="{1B190E78-4C81-4519-A682-78F0FB066844}"/>
+                    </a:ext>
+                  </a:extLst>
+                </p:cNvPr>
+                <p:cNvPicPr>
+                  <a:picLocks noChangeAspect="1"/>
+                </p:cNvPicPr>
+                <p:nvPr/>
+              </p:nvPicPr>
+              <p:blipFill>
+                <a:blip r:embed="rId9"/>
+                <a:stretch>
+                  <a:fillRect/>
+                </a:stretch>
+              </p:blipFill>
+              <p:spPr>
+                <a:xfrm>
+                  <a:off x="7015931" y="2920139"/>
+                  <a:ext cx="2711431" cy="1826733"/>
+                </a:xfrm>
+                <a:prstGeom prst="rect">
+                  <a:avLst/>
+                </a:prstGeom>
+              </p:spPr>
+            </p:pic>
+            <p:pic>
+              <p:nvPicPr>
+                <p:cNvPr id="65" name="Imagem 64" descr="icon_mapa">
+                  <a:extLst>
+                    <a:ext uri="{FF2B5EF4-FFF2-40B4-BE49-F238E27FC236}">
+                      <a16:creationId xmlns:a16="http://schemas.microsoft.com/office/drawing/2014/main" id="{5385C365-51CE-4DD2-95EC-4460B7179C77}"/>
+                    </a:ext>
+                  </a:extLst>
+                </p:cNvPr>
+                <p:cNvPicPr>
+                  <a:picLocks noChangeAspect="1"/>
+                </p:cNvPicPr>
+                <p:nvPr/>
+              </p:nvPicPr>
+              <p:blipFill>
+                <a:blip r:embed="rId14"/>
+                <a:stretch>
+                  <a:fillRect/>
+                </a:stretch>
+              </p:blipFill>
+              <p:spPr>
+                <a:xfrm>
+                  <a:off x="7845724" y="3108575"/>
+                  <a:ext cx="1540449" cy="944188"/>
+                </a:xfrm>
+                <a:prstGeom prst="roundRect">
+                  <a:avLst/>
+                </a:prstGeom>
+                <a:ln w="0">
+                  <a:solidFill>
+                    <a:schemeClr val="tx1"/>
+                  </a:solidFill>
+                </a:ln>
+              </p:spPr>
+            </p:pic>
+          </p:grpSp>
+          <p:grpSp>
+            <p:nvGrpSpPr>
+              <p:cNvPr id="69" name="Agrupar 68">
+                <a:extLst>
+                  <a:ext uri="{FF2B5EF4-FFF2-40B4-BE49-F238E27FC236}">
+                    <a16:creationId xmlns:a16="http://schemas.microsoft.com/office/drawing/2014/main" id="{F742872A-F291-4DE2-AF2A-8E33381C3AA8}"/>
+                  </a:ext>
+                </a:extLst>
+              </p:cNvPr>
+              <p:cNvGrpSpPr/>
+              <p:nvPr/>
+            </p:nvGrpSpPr>
+            <p:grpSpPr>
+              <a:xfrm>
+                <a:off x="10154360" y="3971584"/>
+                <a:ext cx="1564555" cy="1691420"/>
+                <a:chOff x="10154360" y="3971584"/>
+                <a:chExt cx="1564555" cy="1691420"/>
+              </a:xfrm>
+            </p:grpSpPr>
+            <p:pic>
+              <p:nvPicPr>
+                <p:cNvPr id="66" name="Imagem 65" descr="icon_celular">
+                  <a:extLst>
+                    <a:ext uri="{FF2B5EF4-FFF2-40B4-BE49-F238E27FC236}">
+                      <a16:creationId xmlns:a16="http://schemas.microsoft.com/office/drawing/2014/main" id="{D2F6249B-DE76-42C7-BD52-F66916BCE960}"/>
+                    </a:ext>
+                  </a:extLst>
+                </p:cNvPr>
+                <p:cNvPicPr>
+                  <a:picLocks noChangeAspect="1"/>
+                </p:cNvPicPr>
+                <p:nvPr/>
+              </p:nvPicPr>
+              <p:blipFill>
+                <a:blip r:embed="rId15">
+                  <a:clrChange>
+                    <a:clrFrom>
+                      <a:srgbClr val="FFFFFF">
+                        <a:alpha val="100000"/>
+                      </a:srgbClr>
+                    </a:clrFrom>
+                    <a:clrTo>
+                      <a:srgbClr val="FFFFFF">
+                        <a:alpha val="100000"/>
+                        <a:alpha val="0"/>
+                      </a:srgbClr>
+                    </a:clrTo>
+                  </a:clrChange>
+                </a:blip>
+                <a:stretch>
+                  <a:fillRect/>
+                </a:stretch>
+              </p:blipFill>
+              <p:spPr>
+                <a:xfrm>
+                  <a:off x="10154360" y="3971584"/>
+                  <a:ext cx="1564555" cy="1691420"/>
+                </a:xfrm>
+                <a:prstGeom prst="rect">
+                  <a:avLst/>
+                </a:prstGeom>
+              </p:spPr>
+            </p:pic>
+            <p:pic>
+              <p:nvPicPr>
+                <p:cNvPr id="67" name="Imagem 66" descr="icon_mapa">
+                  <a:extLst>
+                    <a:ext uri="{FF2B5EF4-FFF2-40B4-BE49-F238E27FC236}">
+                      <a16:creationId xmlns:a16="http://schemas.microsoft.com/office/drawing/2014/main" id="{FC6CBAC3-6980-459B-B871-5464B8D57CD6}"/>
+                    </a:ext>
+                  </a:extLst>
+                </p:cNvPr>
+                <p:cNvPicPr>
+                  <a:picLocks noChangeAspect="1"/>
+                </p:cNvPicPr>
+                <p:nvPr/>
+              </p:nvPicPr>
+              <p:blipFill>
+                <a:blip r:embed="rId14"/>
+                <a:stretch>
+                  <a:fillRect/>
+                </a:stretch>
+              </p:blipFill>
+              <p:spPr>
+                <a:xfrm>
+                  <a:off x="10593826" y="4153004"/>
+                  <a:ext cx="691649" cy="1173720"/>
+                </a:xfrm>
+                <a:prstGeom prst="rect">
+                  <a:avLst/>
+                </a:prstGeom>
+                <a:ln w="0">
+                  <a:solidFill>
+                    <a:schemeClr val="tx1"/>
+                  </a:solidFill>
+                </a:ln>
+              </p:spPr>
+            </p:pic>
+          </p:grpSp>
+        </p:grpSp>
+      </p:grpSp>
+    </p:spTree>
+    <p:extLst>
+      <p:ext uri="{BB962C8B-B14F-4D97-AF65-F5344CB8AC3E}">
+        <p14:creationId xmlns:p14="http://schemas.microsoft.com/office/powerpoint/2010/main" val="3248713380"/>
+      </p:ext>
+    </p:extLst>
   </p:cSld>
   <p:clrMapOvr>
     <a:masterClrMapping/>

</xml_diff>